<commit_message>
updated scripts for week 11
</commit_message>
<xml_diff>
--- a/lectures/le10_glms.pptx
+++ b/lectures/le10_glms.pptx
@@ -4686,7 +4686,7 @@
         <p:spPr/>
         <p:txBody>
           <a:bodyPr>
-            <a:normAutofit fontScale="92500"/>
+            <a:normAutofit fontScale="92500" lnSpcReduction="10000"/>
           </a:bodyPr>
           <a:lstStyle/>
           <a:p>
@@ -4730,7 +4730,7 @@
             <a:pPr lvl="2"/>
             <a:r>
               <a:rPr lang="en-US" dirty="0"/>
-              <a:t>Possible options: zero-inflated models and bias-reduction models, correlated data e.g. </a:t>
+              <a:t>Possible options: zero-inflated models/hurdle models (x1) and bias-reduction models, correlated data e.g. </a:t>
             </a:r>
             <a:r>
               <a:rPr lang="en-US" dirty="0" err="1"/>
@@ -4738,11 +4738,15 @@
             </a:r>
             <a:r>
               <a:rPr lang="en-US" dirty="0"/>
-              <a:t> models, autoregressive models (time series data), shiny apps, power analyses, non-linear models, machine learning (not my </a:t>
+              <a:t> models, autoregressive models (time series data x2), shiny apps, power analyses x2, non-linear models &amp; GAM/</a:t>
             </a:r>
             <a:r>
               <a:rPr lang="en-US" dirty="0" err="1"/>
-              <a:t>speciality</a:t>
+              <a:t>Ms</a:t>
+            </a:r>
+            <a:r>
+              <a:rPr lang="en-US" dirty="0"/>
+              <a:t> x1, machine learning (not my specialty</a:t>
             </a:r>
             <a:r>
               <a:rPr lang="mr-IN" dirty="0"/>
@@ -4750,7 +4754,7 @@
             </a:r>
             <a:r>
               <a:rPr lang="en-US" dirty="0"/>
-              <a:t>), ODE models</a:t>
+              <a:t>), ODE models </a:t>
             </a:r>
           </a:p>
           <a:p>

</xml_diff>